<commit_message>
ethics of AI improvement
</commit_message>
<xml_diff>
--- a/presentations/session-5-application-of-ai.pptx
+++ b/presentations/session-5-application-of-ai.pptx
@@ -5,7 +5,7 @@
     <p:sldMasterId id="2147483648" r:id="rId1"/>
   </p:sldMasterIdLst>
   <p:notesMasterIdLst>
-    <p:notesMasterId r:id="rId38"/>
+    <p:notesMasterId r:id="rId37"/>
   </p:notesMasterIdLst>
   <p:sldIdLst>
     <p:sldId id="263" r:id="rId2"/>
@@ -27,23 +27,22 @@
     <p:sldId id="591" r:id="rId18"/>
     <p:sldId id="586" r:id="rId19"/>
     <p:sldId id="589" r:id="rId20"/>
-    <p:sldId id="565" r:id="rId21"/>
-    <p:sldId id="588" r:id="rId22"/>
-    <p:sldId id="568" r:id="rId23"/>
-    <p:sldId id="567" r:id="rId24"/>
-    <p:sldId id="569" r:id="rId25"/>
-    <p:sldId id="570" r:id="rId26"/>
-    <p:sldId id="571" r:id="rId27"/>
-    <p:sldId id="572" r:id="rId28"/>
-    <p:sldId id="574" r:id="rId29"/>
-    <p:sldId id="575" r:id="rId30"/>
-    <p:sldId id="577" r:id="rId31"/>
-    <p:sldId id="578" r:id="rId32"/>
-    <p:sldId id="579" r:id="rId33"/>
-    <p:sldId id="580" r:id="rId34"/>
-    <p:sldId id="581" r:id="rId35"/>
-    <p:sldId id="594" r:id="rId36"/>
-    <p:sldId id="595" r:id="rId37"/>
+    <p:sldId id="588" r:id="rId21"/>
+    <p:sldId id="568" r:id="rId22"/>
+    <p:sldId id="567" r:id="rId23"/>
+    <p:sldId id="569" r:id="rId24"/>
+    <p:sldId id="570" r:id="rId25"/>
+    <p:sldId id="571" r:id="rId26"/>
+    <p:sldId id="572" r:id="rId27"/>
+    <p:sldId id="574" r:id="rId28"/>
+    <p:sldId id="575" r:id="rId29"/>
+    <p:sldId id="577" r:id="rId30"/>
+    <p:sldId id="578" r:id="rId31"/>
+    <p:sldId id="579" r:id="rId32"/>
+    <p:sldId id="580" r:id="rId33"/>
+    <p:sldId id="581" r:id="rId34"/>
+    <p:sldId id="594" r:id="rId35"/>
+    <p:sldId id="595" r:id="rId36"/>
   </p:sldIdLst>
   <p:sldSz cx="12192000" cy="6858000"/>
   <p:notesSz cx="6797675" cy="9874250"/>
@@ -1933,7 +1932,7 @@
     </p:spTree>
     <p:extLst>
       <p:ext uri="{BB962C8B-B14F-4D97-AF65-F5344CB8AC3E}">
-        <p14:creationId xmlns:p14="http://schemas.microsoft.com/office/powerpoint/2010/main" val="333752062"/>
+        <p14:creationId xmlns:p14="http://schemas.microsoft.com/office/powerpoint/2010/main" val="2797618694"/>
       </p:ext>
     </p:extLst>
   </p:cSld>
@@ -2017,7 +2016,7 @@
     </p:spTree>
     <p:extLst>
       <p:ext uri="{BB962C8B-B14F-4D97-AF65-F5344CB8AC3E}">
-        <p14:creationId xmlns:p14="http://schemas.microsoft.com/office/powerpoint/2010/main" val="2797618694"/>
+        <p14:creationId xmlns:p14="http://schemas.microsoft.com/office/powerpoint/2010/main" val="1586155269"/>
       </p:ext>
     </p:extLst>
   </p:cSld>
@@ -2071,6 +2070,66 @@
           <a:bodyPr/>
           <a:lstStyle/>
           <a:p>
+            <a:r>
+              <a:rPr lang="fr-FR" dirty="0"/>
+              <a:t>Ex: </a:t>
+            </a:r>
+            <a:r>
+              <a:rPr lang="fr-FR" dirty="0" err="1"/>
+              <a:t>soil</a:t>
+            </a:r>
+            <a:r>
+              <a:rPr lang="fr-FR" dirty="0"/>
+              <a:t> </a:t>
+            </a:r>
+            <a:r>
+              <a:rPr lang="fr-FR" dirty="0" err="1"/>
+              <a:t>moisture</a:t>
+            </a:r>
+            <a:r>
+              <a:rPr lang="fr-FR" dirty="0"/>
+              <a:t> (</a:t>
+            </a:r>
+            <a:r>
+              <a:rPr lang="fr-FR" dirty="0" err="1"/>
+              <a:t>target</a:t>
+            </a:r>
+            <a:r>
+              <a:rPr lang="fr-FR" dirty="0"/>
+              <a:t>) </a:t>
+            </a:r>
+            <a:r>
+              <a:rPr lang="fr-FR" dirty="0" err="1"/>
+              <a:t>given</a:t>
+            </a:r>
+            <a:r>
+              <a:rPr lang="fr-FR" dirty="0"/>
+              <a:t> </a:t>
+            </a:r>
+            <a:r>
+              <a:rPr lang="fr-FR" dirty="0" err="1"/>
+              <a:t>temperature</a:t>
+            </a:r>
+            <a:r>
+              <a:rPr lang="fr-FR" dirty="0"/>
+              <a:t>, distance </a:t>
+            </a:r>
+            <a:r>
+              <a:rPr lang="fr-FR" dirty="0" err="1"/>
+              <a:t>from</a:t>
+            </a:r>
+            <a:r>
+              <a:rPr lang="fr-FR" dirty="0"/>
+              <a:t> river, ... (</a:t>
+            </a:r>
+            <a:r>
+              <a:rPr lang="fr-FR" dirty="0" err="1"/>
+              <a:t>features</a:t>
+            </a:r>
+            <a:r>
+              <a:rPr lang="fr-FR" dirty="0"/>
+              <a:t>)</a:t>
+            </a:r>
             <a:endParaRPr lang="en-US" dirty="0"/>
           </a:p>
         </p:txBody>
@@ -2101,7 +2160,7 @@
     </p:spTree>
     <p:extLst>
       <p:ext uri="{BB962C8B-B14F-4D97-AF65-F5344CB8AC3E}">
-        <p14:creationId xmlns:p14="http://schemas.microsoft.com/office/powerpoint/2010/main" val="1586155269"/>
+        <p14:creationId xmlns:p14="http://schemas.microsoft.com/office/powerpoint/2010/main" val="2821334826"/>
       </p:ext>
     </p:extLst>
   </p:cSld>
@@ -2155,66 +2214,6 @@
           <a:bodyPr/>
           <a:lstStyle/>
           <a:p>
-            <a:r>
-              <a:rPr lang="fr-FR" dirty="0"/>
-              <a:t>Ex: </a:t>
-            </a:r>
-            <a:r>
-              <a:rPr lang="fr-FR" dirty="0" err="1"/>
-              <a:t>soil</a:t>
-            </a:r>
-            <a:r>
-              <a:rPr lang="fr-FR" dirty="0"/>
-              <a:t> </a:t>
-            </a:r>
-            <a:r>
-              <a:rPr lang="fr-FR" dirty="0" err="1"/>
-              <a:t>moisture</a:t>
-            </a:r>
-            <a:r>
-              <a:rPr lang="fr-FR" dirty="0"/>
-              <a:t> (</a:t>
-            </a:r>
-            <a:r>
-              <a:rPr lang="fr-FR" dirty="0" err="1"/>
-              <a:t>target</a:t>
-            </a:r>
-            <a:r>
-              <a:rPr lang="fr-FR" dirty="0"/>
-              <a:t>) </a:t>
-            </a:r>
-            <a:r>
-              <a:rPr lang="fr-FR" dirty="0" err="1"/>
-              <a:t>given</a:t>
-            </a:r>
-            <a:r>
-              <a:rPr lang="fr-FR" dirty="0"/>
-              <a:t> </a:t>
-            </a:r>
-            <a:r>
-              <a:rPr lang="fr-FR" dirty="0" err="1"/>
-              <a:t>temperature</a:t>
-            </a:r>
-            <a:r>
-              <a:rPr lang="fr-FR" dirty="0"/>
-              <a:t>, distance </a:t>
-            </a:r>
-            <a:r>
-              <a:rPr lang="fr-FR" dirty="0" err="1"/>
-              <a:t>from</a:t>
-            </a:r>
-            <a:r>
-              <a:rPr lang="fr-FR" dirty="0"/>
-              <a:t> river, ... (</a:t>
-            </a:r>
-            <a:r>
-              <a:rPr lang="fr-FR" dirty="0" err="1"/>
-              <a:t>features</a:t>
-            </a:r>
-            <a:r>
-              <a:rPr lang="fr-FR" dirty="0"/>
-              <a:t>)</a:t>
-            </a:r>
             <a:endParaRPr lang="en-US" dirty="0"/>
           </a:p>
         </p:txBody>
@@ -2245,7 +2244,7 @@
     </p:spTree>
     <p:extLst>
       <p:ext uri="{BB962C8B-B14F-4D97-AF65-F5344CB8AC3E}">
-        <p14:creationId xmlns:p14="http://schemas.microsoft.com/office/powerpoint/2010/main" val="2821334826"/>
+        <p14:creationId xmlns:p14="http://schemas.microsoft.com/office/powerpoint/2010/main" val="1179908455"/>
       </p:ext>
     </p:extLst>
   </p:cSld>
@@ -2329,7 +2328,7 @@
     </p:spTree>
     <p:extLst>
       <p:ext uri="{BB962C8B-B14F-4D97-AF65-F5344CB8AC3E}">
-        <p14:creationId xmlns:p14="http://schemas.microsoft.com/office/powerpoint/2010/main" val="1179908455"/>
+        <p14:creationId xmlns:p14="http://schemas.microsoft.com/office/powerpoint/2010/main" val="3086997894"/>
       </p:ext>
     </p:extLst>
   </p:cSld>
@@ -2413,7 +2412,7 @@
     </p:spTree>
     <p:extLst>
       <p:ext uri="{BB962C8B-B14F-4D97-AF65-F5344CB8AC3E}">
-        <p14:creationId xmlns:p14="http://schemas.microsoft.com/office/powerpoint/2010/main" val="3086997894"/>
+        <p14:creationId xmlns:p14="http://schemas.microsoft.com/office/powerpoint/2010/main" val="1099359813"/>
       </p:ext>
     </p:extLst>
   </p:cSld>
@@ -2497,7 +2496,7 @@
     </p:spTree>
     <p:extLst>
       <p:ext uri="{BB962C8B-B14F-4D97-AF65-F5344CB8AC3E}">
-        <p14:creationId xmlns:p14="http://schemas.microsoft.com/office/powerpoint/2010/main" val="1099359813"/>
+        <p14:creationId xmlns:p14="http://schemas.microsoft.com/office/powerpoint/2010/main" val="538600896"/>
       </p:ext>
     </p:extLst>
   </p:cSld>
@@ -2581,7 +2580,7 @@
     </p:spTree>
     <p:extLst>
       <p:ext uri="{BB962C8B-B14F-4D97-AF65-F5344CB8AC3E}">
-        <p14:creationId xmlns:p14="http://schemas.microsoft.com/office/powerpoint/2010/main" val="538600896"/>
+        <p14:creationId xmlns:p14="http://schemas.microsoft.com/office/powerpoint/2010/main" val="2539212987"/>
       </p:ext>
     </p:extLst>
   </p:cSld>
@@ -2665,7 +2664,7 @@
     </p:spTree>
     <p:extLst>
       <p:ext uri="{BB962C8B-B14F-4D97-AF65-F5344CB8AC3E}">
-        <p14:creationId xmlns:p14="http://schemas.microsoft.com/office/powerpoint/2010/main" val="2539212987"/>
+        <p14:creationId xmlns:p14="http://schemas.microsoft.com/office/powerpoint/2010/main" val="2038087505"/>
       </p:ext>
     </p:extLst>
   </p:cSld>
@@ -2749,7 +2748,7 @@
     </p:spTree>
     <p:extLst>
       <p:ext uri="{BB962C8B-B14F-4D97-AF65-F5344CB8AC3E}">
-        <p14:creationId xmlns:p14="http://schemas.microsoft.com/office/powerpoint/2010/main" val="2038087505"/>
+        <p14:creationId xmlns:p14="http://schemas.microsoft.com/office/powerpoint/2010/main" val="997152534"/>
       </p:ext>
     </p:extLst>
   </p:cSld>
@@ -2921,7 +2920,7 @@
     </p:spTree>
     <p:extLst>
       <p:ext uri="{BB962C8B-B14F-4D97-AF65-F5344CB8AC3E}">
-        <p14:creationId xmlns:p14="http://schemas.microsoft.com/office/powerpoint/2010/main" val="997152534"/>
+        <p14:creationId xmlns:p14="http://schemas.microsoft.com/office/powerpoint/2010/main" val="242776460"/>
       </p:ext>
     </p:extLst>
   </p:cSld>
@@ -3005,7 +3004,7 @@
     </p:spTree>
     <p:extLst>
       <p:ext uri="{BB962C8B-B14F-4D97-AF65-F5344CB8AC3E}">
-        <p14:creationId xmlns:p14="http://schemas.microsoft.com/office/powerpoint/2010/main" val="242776460"/>
+        <p14:creationId xmlns:p14="http://schemas.microsoft.com/office/powerpoint/2010/main" val="2802083561"/>
       </p:ext>
     </p:extLst>
   </p:cSld>
@@ -3089,7 +3088,7 @@
     </p:spTree>
     <p:extLst>
       <p:ext uri="{BB962C8B-B14F-4D97-AF65-F5344CB8AC3E}">
-        <p14:creationId xmlns:p14="http://schemas.microsoft.com/office/powerpoint/2010/main" val="2802083561"/>
+        <p14:creationId xmlns:p14="http://schemas.microsoft.com/office/powerpoint/2010/main" val="1824914223"/>
       </p:ext>
     </p:extLst>
   </p:cSld>
@@ -3173,7 +3172,7 @@
     </p:spTree>
     <p:extLst>
       <p:ext uri="{BB962C8B-B14F-4D97-AF65-F5344CB8AC3E}">
-        <p14:creationId xmlns:p14="http://schemas.microsoft.com/office/powerpoint/2010/main" val="1824914223"/>
+        <p14:creationId xmlns:p14="http://schemas.microsoft.com/office/powerpoint/2010/main" val="1096447992"/>
       </p:ext>
     </p:extLst>
   </p:cSld>
@@ -3257,7 +3256,7 @@
     </p:spTree>
     <p:extLst>
       <p:ext uri="{BB962C8B-B14F-4D97-AF65-F5344CB8AC3E}">
-        <p14:creationId xmlns:p14="http://schemas.microsoft.com/office/powerpoint/2010/main" val="1096447992"/>
+        <p14:creationId xmlns:p14="http://schemas.microsoft.com/office/powerpoint/2010/main" val="2432484917"/>
       </p:ext>
     </p:extLst>
   </p:cSld>
@@ -3311,7 +3310,10 @@
           <a:bodyPr/>
           <a:lstStyle/>
           <a:p>
-            <a:endParaRPr lang="en-US" dirty="0"/>
+            <a:r>
+              <a:rPr lang="en-US" dirty="0"/>
+              <a:t>To be discussed in further session</a:t>
+            </a:r>
           </a:p>
         </p:txBody>
       </p:sp>
@@ -3333,93 +3335,6 @@
             <a:fld id="{2F6F93F9-6E01-423B-ABB3-8FB3B0651941}" type="slidenum">
               <a:rPr lang="en-US" smtClean="0"/>
               <a:t>35</a:t>
-            </a:fld>
-            <a:endParaRPr lang="en-US"/>
-          </a:p>
-        </p:txBody>
-      </p:sp>
-    </p:spTree>
-    <p:extLst>
-      <p:ext uri="{BB962C8B-B14F-4D97-AF65-F5344CB8AC3E}">
-        <p14:creationId xmlns:p14="http://schemas.microsoft.com/office/powerpoint/2010/main" val="2432484917"/>
-      </p:ext>
-    </p:extLst>
-  </p:cSld>
-  <p:clrMapOvr>
-    <a:masterClrMapping/>
-  </p:clrMapOvr>
-</p:notes>
-</file>
-
-<file path=ppt/notesSlides/notesSlide36.xml><?xml version="1.0" encoding="utf-8"?>
-<p:notes xmlns:a="http://schemas.openxmlformats.org/drawingml/2006/main" xmlns:r="http://schemas.openxmlformats.org/officeDocument/2006/relationships" xmlns:p="http://schemas.openxmlformats.org/presentationml/2006/main">
-  <p:cSld>
-    <p:spTree>
-      <p:nvGrpSpPr>
-        <p:cNvPr id="1" name=""/>
-        <p:cNvGrpSpPr/>
-        <p:nvPr/>
-      </p:nvGrpSpPr>
-      <p:grpSpPr>
-        <a:xfrm>
-          <a:off x="0" y="0"/>
-          <a:ext cx="0" cy="0"/>
-          <a:chOff x="0" y="0"/>
-          <a:chExt cx="0" cy="0"/>
-        </a:xfrm>
-      </p:grpSpPr>
-      <p:sp>
-        <p:nvSpPr>
-          <p:cNvPr id="2" name="Slide Image Placeholder 1"/>
-          <p:cNvSpPr>
-            <a:spLocks noGrp="1" noRot="1" noChangeAspect="1"/>
-          </p:cNvSpPr>
-          <p:nvPr>
-            <p:ph type="sldImg"/>
-          </p:nvPr>
-        </p:nvSpPr>
-        <p:spPr/>
-      </p:sp>
-      <p:sp>
-        <p:nvSpPr>
-          <p:cNvPr id="3" name="Notes Placeholder 2"/>
-          <p:cNvSpPr>
-            <a:spLocks noGrp="1"/>
-          </p:cNvSpPr>
-          <p:nvPr>
-            <p:ph type="body" idx="1"/>
-          </p:nvPr>
-        </p:nvSpPr>
-        <p:spPr/>
-        <p:txBody>
-          <a:bodyPr/>
-          <a:lstStyle/>
-          <a:p>
-            <a:r>
-              <a:rPr lang="en-US" dirty="0"/>
-              <a:t>To be discussed in further session</a:t>
-            </a:r>
-          </a:p>
-        </p:txBody>
-      </p:sp>
-      <p:sp>
-        <p:nvSpPr>
-          <p:cNvPr id="4" name="Slide Number Placeholder 3"/>
-          <p:cNvSpPr>
-            <a:spLocks noGrp="1"/>
-          </p:cNvSpPr>
-          <p:nvPr>
-            <p:ph type="sldNum" sz="quarter" idx="10"/>
-          </p:nvPr>
-        </p:nvSpPr>
-        <p:spPr/>
-        <p:txBody>
-          <a:bodyPr/>
-          <a:lstStyle/>
-          <a:p>
-            <a:fld id="{2F6F93F9-6E01-423B-ABB3-8FB3B0651941}" type="slidenum">
-              <a:rPr lang="en-US" smtClean="0"/>
-              <a:t>36</a:t>
             </a:fld>
             <a:endParaRPr lang="en-US"/>
           </a:p>
@@ -8683,7 +8598,7 @@
                 </a:solidFill>
                 <a:latin typeface="Cambria" panose="02040503050406030204" pitchFamily="18" charset="0"/>
               </a:rPr>
-              <a:t>AI &amp; DEEP LEARNING IS MIMICING WORKING OF THE HUMAN BRAIN!</a:t>
+              <a:t>AI &amp; DEEP LEARNING IS MIMICING WORKING OF THE HUMAN BRAIN?</a:t>
             </a:r>
           </a:p>
         </p:txBody>
@@ -9142,7 +9057,7 @@
     </p:spTree>
     <p:extLst>
       <p:ext uri="{BB962C8B-B14F-4D97-AF65-F5344CB8AC3E}">
-        <p14:creationId xmlns:p14="http://schemas.microsoft.com/office/powerpoint/2010/main" val="2816858463"/>
+        <p14:creationId xmlns:p14="http://schemas.microsoft.com/office/powerpoint/2010/main" val="3929770456"/>
       </p:ext>
     </p:extLst>
   </p:cSld>
@@ -9165,187 +9080,6 @@
 </file>
 
 <file path=ppt/slides/slide21.xml><?xml version="1.0" encoding="utf-8"?>
-<p:sld xmlns:a="http://schemas.openxmlformats.org/drawingml/2006/main" xmlns:r="http://schemas.openxmlformats.org/officeDocument/2006/relationships" xmlns:p="http://schemas.openxmlformats.org/presentationml/2006/main">
-  <p:cSld>
-    <p:spTree>
-      <p:nvGrpSpPr>
-        <p:cNvPr id="1" name=""/>
-        <p:cNvGrpSpPr/>
-        <p:nvPr/>
-      </p:nvGrpSpPr>
-      <p:grpSpPr>
-        <a:xfrm>
-          <a:off x="0" y="0"/>
-          <a:ext cx="0" cy="0"/>
-          <a:chOff x="0" y="0"/>
-          <a:chExt cx="0" cy="0"/>
-        </a:xfrm>
-      </p:grpSpPr>
-      <p:sp>
-        <p:nvSpPr>
-          <p:cNvPr id="8" name="TextBox 7"/>
-          <p:cNvSpPr txBox="1"/>
-          <p:nvPr/>
-        </p:nvSpPr>
-        <p:spPr>
-          <a:xfrm>
-            <a:off x="1271768" y="1115051"/>
-            <a:ext cx="9196386" cy="553998"/>
-          </a:xfrm>
-          <a:prstGeom prst="rect">
-            <a:avLst/>
-          </a:prstGeom>
-          <a:noFill/>
-        </p:spPr>
-        <p:txBody>
-          <a:bodyPr wrap="square" rtlCol="0">
-            <a:spAutoFit/>
-          </a:bodyPr>
-          <a:lstStyle/>
-          <a:p>
-            <a:r>
-              <a:rPr lang="en-US" sz="3000" b="1" dirty="0">
-                <a:solidFill>
-                  <a:schemeClr val="accent1"/>
-                </a:solidFill>
-                <a:latin typeface="Cambria" panose="02040503050406030204" pitchFamily="18" charset="0"/>
-              </a:rPr>
-              <a:t>CLASSICAL STATISTICS MINDSET</a:t>
-            </a:r>
-          </a:p>
-        </p:txBody>
-      </p:sp>
-      <p:sp>
-        <p:nvSpPr>
-          <p:cNvPr id="3" name="TextBox 2">
-            <a:extLst>
-              <a:ext uri="{FF2B5EF4-FFF2-40B4-BE49-F238E27FC236}">
-                <a16:creationId xmlns:a16="http://schemas.microsoft.com/office/drawing/2014/main" id="{325412E6-3DC9-2147-B691-12F936C79AB2}"/>
-              </a:ext>
-            </a:extLst>
-          </p:cNvPr>
-          <p:cNvSpPr txBox="1"/>
-          <p:nvPr/>
-        </p:nvSpPr>
-        <p:spPr>
-          <a:xfrm>
-            <a:off x="1271768" y="1990256"/>
-            <a:ext cx="9909364" cy="1569660"/>
-          </a:xfrm>
-          <a:prstGeom prst="rect">
-            <a:avLst/>
-          </a:prstGeom>
-          <a:noFill/>
-        </p:spPr>
-        <p:txBody>
-          <a:bodyPr wrap="square" rtlCol="0">
-            <a:spAutoFit/>
-          </a:bodyPr>
-          <a:lstStyle/>
-          <a:p>
-            <a:pPr marL="342900" indent="-342900">
-              <a:buFont typeface="Arial"/>
-              <a:buChar char="•"/>
-            </a:pPr>
-            <a:r>
-              <a:rPr lang="en-US" sz="2400" b="1" dirty="0">
-                <a:solidFill>
-                  <a:schemeClr val="accent1"/>
-                </a:solidFill>
-                <a:latin typeface="Cambria" panose="02040503050406030204" pitchFamily="18" charset="0"/>
-              </a:rPr>
-              <a:t>ASSUME THAT MODELS WITH HIGH EXPLANATORY POWER ARE INHERENTLY OF HIGH PREDICTIVE POWER</a:t>
-            </a:r>
-            <a:br>
-              <a:rPr lang="en-US" sz="2400" b="1" dirty="0">
-                <a:solidFill>
-                  <a:schemeClr val="accent1"/>
-                </a:solidFill>
-                <a:latin typeface="Cambria" panose="02040503050406030204" pitchFamily="18" charset="0"/>
-              </a:rPr>
-            </a:br>
-            <a:br>
-              <a:rPr lang="en-US" sz="2400" dirty="0">
-                <a:solidFill>
-                  <a:schemeClr val="accent1"/>
-                </a:solidFill>
-                <a:latin typeface="Cambria" panose="02040503050406030204" pitchFamily="18" charset="0"/>
-              </a:rPr>
-            </a:br>
-            <a:endParaRPr lang="en-US" sz="2400" dirty="0">
-              <a:solidFill>
-                <a:schemeClr val="accent1"/>
-              </a:solidFill>
-              <a:latin typeface="Cambria" panose="02040503050406030204" pitchFamily="18" charset="0"/>
-            </a:endParaRPr>
-          </a:p>
-        </p:txBody>
-      </p:sp>
-      <p:cxnSp>
-        <p:nvCxnSpPr>
-          <p:cNvPr id="4" name="Straight Connector 3">
-            <a:extLst>
-              <a:ext uri="{FF2B5EF4-FFF2-40B4-BE49-F238E27FC236}">
-                <a16:creationId xmlns:a16="http://schemas.microsoft.com/office/drawing/2014/main" id="{A829723C-F16D-A344-8A30-EA7814BAB058}"/>
-              </a:ext>
-            </a:extLst>
-          </p:cNvPr>
-          <p:cNvCxnSpPr>
-            <a:cxnSpLocks/>
-          </p:cNvCxnSpPr>
-          <p:nvPr/>
-        </p:nvCxnSpPr>
-        <p:spPr>
-          <a:xfrm>
-            <a:off x="1378101" y="1753299"/>
-            <a:ext cx="9160359" cy="0"/>
-          </a:xfrm>
-          <a:prstGeom prst="line">
-            <a:avLst/>
-          </a:prstGeom>
-          <a:ln w="12700"/>
-        </p:spPr>
-        <p:style>
-          <a:lnRef idx="1">
-            <a:schemeClr val="accent1"/>
-          </a:lnRef>
-          <a:fillRef idx="0">
-            <a:schemeClr val="accent1"/>
-          </a:fillRef>
-          <a:effectRef idx="0">
-            <a:schemeClr val="accent1"/>
-          </a:effectRef>
-          <a:fontRef idx="minor">
-            <a:schemeClr val="tx1"/>
-          </a:fontRef>
-        </p:style>
-      </p:cxnSp>
-    </p:spTree>
-    <p:extLst>
-      <p:ext uri="{BB962C8B-B14F-4D97-AF65-F5344CB8AC3E}">
-        <p14:creationId xmlns:p14="http://schemas.microsoft.com/office/powerpoint/2010/main" val="3929770456"/>
-      </p:ext>
-    </p:extLst>
-  </p:cSld>
-  <p:clrMapOvr>
-    <a:masterClrMapping/>
-  </p:clrMapOvr>
-  <mc:AlternateContent xmlns:mc="http://schemas.openxmlformats.org/markup-compatibility/2006" xmlns:p14="http://schemas.microsoft.com/office/powerpoint/2010/main">
-    <mc:Choice Requires="p14">
-      <p:transition spd="med" p14:dur="700">
-        <p:fade/>
-      </p:transition>
-    </mc:Choice>
-    <mc:Fallback xmlns="">
-      <p:transition spd="med">
-        <p:fade/>
-      </p:transition>
-    </mc:Fallback>
-  </mc:AlternateContent>
-</p:sld>
-</file>
-
-<file path=ppt/slides/slide22.xml><?xml version="1.0" encoding="utf-8"?>
 <p:sld xmlns:a="http://schemas.openxmlformats.org/drawingml/2006/main" xmlns:r="http://schemas.openxmlformats.org/officeDocument/2006/relationships" xmlns:p="http://schemas.openxmlformats.org/presentationml/2006/main">
   <p:cSld>
     <p:spTree>
@@ -9574,7 +9308,7 @@
 </p:sld>
 </file>
 
-<file path=ppt/slides/slide23.xml><?xml version="1.0" encoding="utf-8"?>
+<file path=ppt/slides/slide22.xml><?xml version="1.0" encoding="utf-8"?>
 <p:sld xmlns:a="http://schemas.openxmlformats.org/drawingml/2006/main" xmlns:r="http://schemas.openxmlformats.org/officeDocument/2006/relationships" xmlns:p="http://schemas.openxmlformats.org/presentationml/2006/main">
   <p:cSld>
     <p:spTree>
@@ -9719,7 +9453,7 @@
 </p:sld>
 </file>
 
-<file path=ppt/slides/slide24.xml><?xml version="1.0" encoding="utf-8"?>
+<file path=ppt/slides/slide23.xml><?xml version="1.0" encoding="utf-8"?>
 <p:sld xmlns:a="http://schemas.openxmlformats.org/drawingml/2006/main" xmlns:r="http://schemas.openxmlformats.org/officeDocument/2006/relationships" xmlns:p="http://schemas.openxmlformats.org/presentationml/2006/main">
   <p:cSld>
     <p:spTree>
@@ -9864,7 +9598,7 @@
 </p:sld>
 </file>
 
-<file path=ppt/slides/slide25.xml><?xml version="1.0" encoding="utf-8"?>
+<file path=ppt/slides/slide24.xml><?xml version="1.0" encoding="utf-8"?>
 <p:sld xmlns:a="http://schemas.openxmlformats.org/drawingml/2006/main" xmlns:r="http://schemas.openxmlformats.org/officeDocument/2006/relationships" xmlns:p="http://schemas.openxmlformats.org/presentationml/2006/main">
   <p:cSld>
     <p:spTree>
@@ -10009,7 +9743,7 @@
 </p:sld>
 </file>
 
-<file path=ppt/slides/slide26.xml><?xml version="1.0" encoding="utf-8"?>
+<file path=ppt/slides/slide25.xml><?xml version="1.0" encoding="utf-8"?>
 <p:sld xmlns:a="http://schemas.openxmlformats.org/drawingml/2006/main" xmlns:r="http://schemas.openxmlformats.org/officeDocument/2006/relationships" xmlns:p="http://schemas.openxmlformats.org/presentationml/2006/main">
   <p:cSld>
     <p:spTree>
@@ -10154,7 +9888,7 @@
 </p:sld>
 </file>
 
-<file path=ppt/slides/slide27.xml><?xml version="1.0" encoding="utf-8"?>
+<file path=ppt/slides/slide26.xml><?xml version="1.0" encoding="utf-8"?>
 <p:sld xmlns:a="http://schemas.openxmlformats.org/drawingml/2006/main" xmlns:r="http://schemas.openxmlformats.org/officeDocument/2006/relationships" xmlns:p="http://schemas.openxmlformats.org/presentationml/2006/main">
   <p:cSld>
     <p:spTree>
@@ -10299,7 +10033,7 @@
 </p:sld>
 </file>
 
-<file path=ppt/slides/slide28.xml><?xml version="1.0" encoding="utf-8"?>
+<file path=ppt/slides/slide27.xml><?xml version="1.0" encoding="utf-8"?>
 <p:sld xmlns:a="http://schemas.openxmlformats.org/drawingml/2006/main" xmlns:r="http://schemas.openxmlformats.org/officeDocument/2006/relationships" xmlns:p="http://schemas.openxmlformats.org/presentationml/2006/main">
   <p:cSld>
     <p:spTree>
@@ -10444,7 +10178,7 @@
 </p:sld>
 </file>
 
-<file path=ppt/slides/slide29.xml><?xml version="1.0" encoding="utf-8"?>
+<file path=ppt/slides/slide28.xml><?xml version="1.0" encoding="utf-8"?>
 <p:sld xmlns:a="http://schemas.openxmlformats.org/drawingml/2006/main" xmlns:r="http://schemas.openxmlformats.org/officeDocument/2006/relationships" xmlns:p="http://schemas.openxmlformats.org/presentationml/2006/main">
   <p:cSld>
     <p:spTree>
@@ -10568,6 +10302,151 @@
     <p:extLst>
       <p:ext uri="{BB962C8B-B14F-4D97-AF65-F5344CB8AC3E}">
         <p14:creationId xmlns:p14="http://schemas.microsoft.com/office/powerpoint/2010/main" val="2159710305"/>
+      </p:ext>
+    </p:extLst>
+  </p:cSld>
+  <p:clrMapOvr>
+    <a:masterClrMapping/>
+  </p:clrMapOvr>
+  <mc:AlternateContent xmlns:mc="http://schemas.openxmlformats.org/markup-compatibility/2006" xmlns:p14="http://schemas.microsoft.com/office/powerpoint/2010/main">
+    <mc:Choice Requires="p14">
+      <p:transition spd="med" p14:dur="700">
+        <p:fade/>
+      </p:transition>
+    </mc:Choice>
+    <mc:Fallback xmlns="">
+      <p:transition spd="med">
+        <p:fade/>
+      </p:transition>
+    </mc:Fallback>
+  </mc:AlternateContent>
+</p:sld>
+</file>
+
+<file path=ppt/slides/slide29.xml><?xml version="1.0" encoding="utf-8"?>
+<p:sld xmlns:a="http://schemas.openxmlformats.org/drawingml/2006/main" xmlns:r="http://schemas.openxmlformats.org/officeDocument/2006/relationships" xmlns:p="http://schemas.openxmlformats.org/presentationml/2006/main">
+  <p:cSld>
+    <p:spTree>
+      <p:nvGrpSpPr>
+        <p:cNvPr id="1" name=""/>
+        <p:cNvGrpSpPr/>
+        <p:nvPr/>
+      </p:nvGrpSpPr>
+      <p:grpSpPr>
+        <a:xfrm>
+          <a:off x="0" y="0"/>
+          <a:ext cx="0" cy="0"/>
+          <a:chOff x="0" y="0"/>
+          <a:chExt cx="0" cy="0"/>
+        </a:xfrm>
+      </p:grpSpPr>
+      <p:sp>
+        <p:nvSpPr>
+          <p:cNvPr id="8" name="TextBox 7"/>
+          <p:cNvSpPr txBox="1"/>
+          <p:nvPr/>
+        </p:nvSpPr>
+        <p:spPr>
+          <a:xfrm>
+            <a:off x="1271768" y="1115051"/>
+            <a:ext cx="9196386" cy="553998"/>
+          </a:xfrm>
+          <a:prstGeom prst="rect">
+            <a:avLst/>
+          </a:prstGeom>
+          <a:noFill/>
+        </p:spPr>
+        <p:txBody>
+          <a:bodyPr wrap="square" rtlCol="0">
+            <a:spAutoFit/>
+          </a:bodyPr>
+          <a:lstStyle/>
+          <a:p>
+            <a:r>
+              <a:rPr lang="en-US" sz="3000" b="1" dirty="0">
+                <a:solidFill>
+                  <a:schemeClr val="accent1"/>
+                </a:solidFill>
+                <a:latin typeface="Cambria" panose="02040503050406030204" pitchFamily="18" charset="0"/>
+              </a:rPr>
+              <a:t>LOGISTIC REGRESSION 2/4: SIGMOID FUNCTION</a:t>
+            </a:r>
+          </a:p>
+        </p:txBody>
+      </p:sp>
+      <p:pic>
+        <p:nvPicPr>
+          <p:cNvPr id="4" name="Picture 3" descr="sigmoid-function.png">
+            <a:extLst>
+              <a:ext uri="{FF2B5EF4-FFF2-40B4-BE49-F238E27FC236}">
+                <a16:creationId xmlns:a16="http://schemas.microsoft.com/office/drawing/2014/main" id="{951C07EF-5164-6848-8F86-28B8040373C5}"/>
+              </a:ext>
+            </a:extLst>
+          </p:cNvPr>
+          <p:cNvPicPr>
+            <a:picLocks noChangeAspect="1"/>
+          </p:cNvPicPr>
+          <p:nvPr/>
+        </p:nvPicPr>
+        <p:blipFill>
+          <a:blip r:embed="rId3"/>
+          <a:stretch>
+            <a:fillRect/>
+          </a:stretch>
+        </p:blipFill>
+        <p:spPr>
+          <a:xfrm>
+            <a:off x="1523824" y="1952058"/>
+            <a:ext cx="5804939" cy="4248472"/>
+          </a:xfrm>
+          <a:prstGeom prst="rect">
+            <a:avLst/>
+          </a:prstGeom>
+        </p:spPr>
+      </p:pic>
+      <p:cxnSp>
+        <p:nvCxnSpPr>
+          <p:cNvPr id="5" name="Straight Connector 4">
+            <a:extLst>
+              <a:ext uri="{FF2B5EF4-FFF2-40B4-BE49-F238E27FC236}">
+                <a16:creationId xmlns:a16="http://schemas.microsoft.com/office/drawing/2014/main" id="{02F750F8-CB20-B842-8BCD-A74835F3AFED}"/>
+              </a:ext>
+            </a:extLst>
+          </p:cNvPr>
+          <p:cNvCxnSpPr>
+            <a:cxnSpLocks/>
+          </p:cNvCxnSpPr>
+          <p:nvPr/>
+        </p:nvCxnSpPr>
+        <p:spPr>
+          <a:xfrm>
+            <a:off x="1378101" y="1753299"/>
+            <a:ext cx="8360259" cy="0"/>
+          </a:xfrm>
+          <a:prstGeom prst="line">
+            <a:avLst/>
+          </a:prstGeom>
+          <a:ln w="12700"/>
+        </p:spPr>
+        <p:style>
+          <a:lnRef idx="1">
+            <a:schemeClr val="accent1"/>
+          </a:lnRef>
+          <a:fillRef idx="0">
+            <a:schemeClr val="accent1"/>
+          </a:fillRef>
+          <a:effectRef idx="0">
+            <a:schemeClr val="accent1"/>
+          </a:effectRef>
+          <a:fontRef idx="minor">
+            <a:schemeClr val="tx1"/>
+          </a:fontRef>
+        </p:style>
+      </p:cxnSp>
+    </p:spTree>
+    <p:extLst>
+      <p:ext uri="{BB962C8B-B14F-4D97-AF65-F5344CB8AC3E}">
+        <p14:creationId xmlns:p14="http://schemas.microsoft.com/office/powerpoint/2010/main" val="3891371234"/>
       </p:ext>
     </p:extLst>
   </p:cSld>
@@ -10784,151 +10663,6 @@
                 </a:solidFill>
                 <a:latin typeface="Cambria" panose="02040503050406030204" pitchFamily="18" charset="0"/>
               </a:rPr>
-              <a:t>LOGISTIC REGRESSION 2/4: SIGMOID FUNCTION</a:t>
-            </a:r>
-          </a:p>
-        </p:txBody>
-      </p:sp>
-      <p:pic>
-        <p:nvPicPr>
-          <p:cNvPr id="4" name="Picture 3" descr="sigmoid-function.png">
-            <a:extLst>
-              <a:ext uri="{FF2B5EF4-FFF2-40B4-BE49-F238E27FC236}">
-                <a16:creationId xmlns:a16="http://schemas.microsoft.com/office/drawing/2014/main" id="{951C07EF-5164-6848-8F86-28B8040373C5}"/>
-              </a:ext>
-            </a:extLst>
-          </p:cNvPr>
-          <p:cNvPicPr>
-            <a:picLocks noChangeAspect="1"/>
-          </p:cNvPicPr>
-          <p:nvPr/>
-        </p:nvPicPr>
-        <p:blipFill>
-          <a:blip r:embed="rId3"/>
-          <a:stretch>
-            <a:fillRect/>
-          </a:stretch>
-        </p:blipFill>
-        <p:spPr>
-          <a:xfrm>
-            <a:off x="1523824" y="1952058"/>
-            <a:ext cx="5804939" cy="4248472"/>
-          </a:xfrm>
-          <a:prstGeom prst="rect">
-            <a:avLst/>
-          </a:prstGeom>
-        </p:spPr>
-      </p:pic>
-      <p:cxnSp>
-        <p:nvCxnSpPr>
-          <p:cNvPr id="5" name="Straight Connector 4">
-            <a:extLst>
-              <a:ext uri="{FF2B5EF4-FFF2-40B4-BE49-F238E27FC236}">
-                <a16:creationId xmlns:a16="http://schemas.microsoft.com/office/drawing/2014/main" id="{02F750F8-CB20-B842-8BCD-A74835F3AFED}"/>
-              </a:ext>
-            </a:extLst>
-          </p:cNvPr>
-          <p:cNvCxnSpPr>
-            <a:cxnSpLocks/>
-          </p:cNvCxnSpPr>
-          <p:nvPr/>
-        </p:nvCxnSpPr>
-        <p:spPr>
-          <a:xfrm>
-            <a:off x="1378101" y="1753299"/>
-            <a:ext cx="8360259" cy="0"/>
-          </a:xfrm>
-          <a:prstGeom prst="line">
-            <a:avLst/>
-          </a:prstGeom>
-          <a:ln w="12700"/>
-        </p:spPr>
-        <p:style>
-          <a:lnRef idx="1">
-            <a:schemeClr val="accent1"/>
-          </a:lnRef>
-          <a:fillRef idx="0">
-            <a:schemeClr val="accent1"/>
-          </a:fillRef>
-          <a:effectRef idx="0">
-            <a:schemeClr val="accent1"/>
-          </a:effectRef>
-          <a:fontRef idx="minor">
-            <a:schemeClr val="tx1"/>
-          </a:fontRef>
-        </p:style>
-      </p:cxnSp>
-    </p:spTree>
-    <p:extLst>
-      <p:ext uri="{BB962C8B-B14F-4D97-AF65-F5344CB8AC3E}">
-        <p14:creationId xmlns:p14="http://schemas.microsoft.com/office/powerpoint/2010/main" val="3891371234"/>
-      </p:ext>
-    </p:extLst>
-  </p:cSld>
-  <p:clrMapOvr>
-    <a:masterClrMapping/>
-  </p:clrMapOvr>
-  <mc:AlternateContent xmlns:mc="http://schemas.openxmlformats.org/markup-compatibility/2006" xmlns:p14="http://schemas.microsoft.com/office/powerpoint/2010/main">
-    <mc:Choice Requires="p14">
-      <p:transition spd="med" p14:dur="700">
-        <p:fade/>
-      </p:transition>
-    </mc:Choice>
-    <mc:Fallback xmlns="">
-      <p:transition spd="med">
-        <p:fade/>
-      </p:transition>
-    </mc:Fallback>
-  </mc:AlternateContent>
-</p:sld>
-</file>
-
-<file path=ppt/slides/slide31.xml><?xml version="1.0" encoding="utf-8"?>
-<p:sld xmlns:a="http://schemas.openxmlformats.org/drawingml/2006/main" xmlns:r="http://schemas.openxmlformats.org/officeDocument/2006/relationships" xmlns:p="http://schemas.openxmlformats.org/presentationml/2006/main">
-  <p:cSld>
-    <p:spTree>
-      <p:nvGrpSpPr>
-        <p:cNvPr id="1" name=""/>
-        <p:cNvGrpSpPr/>
-        <p:nvPr/>
-      </p:nvGrpSpPr>
-      <p:grpSpPr>
-        <a:xfrm>
-          <a:off x="0" y="0"/>
-          <a:ext cx="0" cy="0"/>
-          <a:chOff x="0" y="0"/>
-          <a:chExt cx="0" cy="0"/>
-        </a:xfrm>
-      </p:grpSpPr>
-      <p:sp>
-        <p:nvSpPr>
-          <p:cNvPr id="8" name="TextBox 7"/>
-          <p:cNvSpPr txBox="1"/>
-          <p:nvPr/>
-        </p:nvSpPr>
-        <p:spPr>
-          <a:xfrm>
-            <a:off x="1271768" y="1115051"/>
-            <a:ext cx="9196386" cy="553998"/>
-          </a:xfrm>
-          <a:prstGeom prst="rect">
-            <a:avLst/>
-          </a:prstGeom>
-          <a:noFill/>
-        </p:spPr>
-        <p:txBody>
-          <a:bodyPr wrap="square" rtlCol="0">
-            <a:spAutoFit/>
-          </a:bodyPr>
-          <a:lstStyle/>
-          <a:p>
-            <a:r>
-              <a:rPr lang="en-US" sz="3000" b="1" dirty="0">
-                <a:solidFill>
-                  <a:schemeClr val="accent1"/>
-                </a:solidFill>
-                <a:latin typeface="Cambria" panose="02040503050406030204" pitchFamily="18" charset="0"/>
-              </a:rPr>
               <a:t>LOGISTIC REGRESSION 3/4: AT CRUISING SPEED</a:t>
             </a:r>
           </a:p>
@@ -11126,7 +10860,7 @@
 </p:sld>
 </file>
 
-<file path=ppt/slides/slide32.xml><?xml version="1.0" encoding="utf-8"?>
+<file path=ppt/slides/slide31.xml><?xml version="1.0" encoding="utf-8"?>
 <p:sld xmlns:a="http://schemas.openxmlformats.org/drawingml/2006/main" xmlns:r="http://schemas.openxmlformats.org/officeDocument/2006/relationships" xmlns:p="http://schemas.openxmlformats.org/presentationml/2006/main">
   <p:cSld>
     <p:spTree>
@@ -11271,7 +11005,7 @@
 </p:sld>
 </file>
 
-<file path=ppt/slides/slide33.xml><?xml version="1.0" encoding="utf-8"?>
+<file path=ppt/slides/slide32.xml><?xml version="1.0" encoding="utf-8"?>
 <p:sld xmlns:a="http://schemas.openxmlformats.org/drawingml/2006/main" xmlns:r="http://schemas.openxmlformats.org/officeDocument/2006/relationships" xmlns:p="http://schemas.openxmlformats.org/presentationml/2006/main">
   <p:cSld>
     <p:spTree>
@@ -11471,7 +11205,7 @@
 </p:sld>
 </file>
 
-<file path=ppt/slides/slide34.xml><?xml version="1.0" encoding="utf-8"?>
+<file path=ppt/slides/slide33.xml><?xml version="1.0" encoding="utf-8"?>
 <p:sld xmlns:a="http://schemas.openxmlformats.org/drawingml/2006/main" xmlns:r="http://schemas.openxmlformats.org/officeDocument/2006/relationships" xmlns:p="http://schemas.openxmlformats.org/presentationml/2006/main">
   <p:cSld>
     <p:spTree>
@@ -11665,7 +11399,7 @@
 </p:sld>
 </file>
 
-<file path=ppt/slides/slide35.xml><?xml version="1.0" encoding="utf-8"?>
+<file path=ppt/slides/slide34.xml><?xml version="1.0" encoding="utf-8"?>
 <p:sld xmlns:a="http://schemas.openxmlformats.org/drawingml/2006/main" xmlns:r="http://schemas.openxmlformats.org/officeDocument/2006/relationships" xmlns:p="http://schemas.openxmlformats.org/presentationml/2006/main">
   <p:cSld>
     <p:spTree>
@@ -11859,7 +11593,7 @@
 </p:sld>
 </file>
 
-<file path=ppt/slides/slide36.xml><?xml version="1.0" encoding="utf-8"?>
+<file path=ppt/slides/slide35.xml><?xml version="1.0" encoding="utf-8"?>
 <p:sld xmlns:a="http://schemas.openxmlformats.org/drawingml/2006/main" xmlns:r="http://schemas.openxmlformats.org/officeDocument/2006/relationships" xmlns:p="http://schemas.openxmlformats.org/presentationml/2006/main">
   <p:cSld>
     <p:spTree>
@@ -11924,8 +11658,8 @@
         </p:nvSpPr>
         <p:spPr>
           <a:xfrm>
-            <a:off x="1275701" y="2033436"/>
-            <a:ext cx="9909364" cy="2308324"/>
+            <a:off x="5869961" y="2174149"/>
+            <a:ext cx="5720059" cy="3416320"/>
           </a:xfrm>
           <a:prstGeom prst="rect">
             <a:avLst/>
@@ -12007,7 +11741,7 @@
                 </a:solidFill>
                 <a:latin typeface="Cambria" panose="02040503050406030204" pitchFamily="18" charset="0"/>
               </a:rPr>
-              <a:t>BUT ON VERY SPECIFIC/NARROW TASKS</a:t>
+              <a:t>BUT ON VERY SPECIFIC/NARROW TASKS [FOR NOW]</a:t>
             </a:r>
             <a:br>
               <a:rPr lang="en-US" sz="2400" b="1" dirty="0">
@@ -12043,7 +11777,7 @@
         <p:spPr>
           <a:xfrm>
             <a:off x="1378101" y="1753299"/>
-            <a:ext cx="5632299" cy="0"/>
+            <a:ext cx="9541359" cy="0"/>
           </a:xfrm>
           <a:prstGeom prst="line">
             <a:avLst/>
@@ -12065,6 +11799,146 @@
           </a:fontRef>
         </p:style>
       </p:cxnSp>
+      <p:pic>
+        <p:nvPicPr>
+          <p:cNvPr id="3" name="Picture 2">
+            <a:extLst>
+              <a:ext uri="{FF2B5EF4-FFF2-40B4-BE49-F238E27FC236}">
+                <a16:creationId xmlns:a16="http://schemas.microsoft.com/office/drawing/2014/main" id="{612C4666-E3E4-AC4E-BEC5-F40350C63F0A}"/>
+              </a:ext>
+            </a:extLst>
+          </p:cNvPr>
+          <p:cNvPicPr>
+            <a:picLocks noChangeAspect="1"/>
+          </p:cNvPicPr>
+          <p:nvPr/>
+        </p:nvPicPr>
+        <p:blipFill>
+          <a:blip r:embed="rId3"/>
+          <a:stretch>
+            <a:fillRect/>
+          </a:stretch>
+        </p:blipFill>
+        <p:spPr>
+          <a:xfrm>
+            <a:off x="1378101" y="1998353"/>
+            <a:ext cx="4266490" cy="3645992"/>
+          </a:xfrm>
+          <a:prstGeom prst="rect">
+            <a:avLst/>
+          </a:prstGeom>
+        </p:spPr>
+      </p:pic>
+      <p:sp>
+        <p:nvSpPr>
+          <p:cNvPr id="7" name="Rectangle 6">
+            <a:extLst>
+              <a:ext uri="{FF2B5EF4-FFF2-40B4-BE49-F238E27FC236}">
+                <a16:creationId xmlns:a16="http://schemas.microsoft.com/office/drawing/2014/main" id="{35B1B9AD-5DEA-F94C-96D8-F33119DEFB3A}"/>
+              </a:ext>
+            </a:extLst>
+          </p:cNvPr>
+          <p:cNvSpPr/>
+          <p:nvPr/>
+        </p:nvSpPr>
+        <p:spPr>
+          <a:xfrm>
+            <a:off x="1271768" y="5704732"/>
+            <a:ext cx="3681905" cy="369332"/>
+          </a:xfrm>
+          <a:prstGeom prst="rect">
+            <a:avLst/>
+          </a:prstGeom>
+        </p:spPr>
+        <p:txBody>
+          <a:bodyPr wrap="none">
+            <a:spAutoFit/>
+          </a:bodyPr>
+          <a:lstStyle/>
+          <a:p>
+            <a:r>
+              <a:rPr lang="fr-FR" dirty="0">
+                <a:hlinkClick r:id="rId4"/>
+              </a:rPr>
+              <a:t>https://</a:t>
+            </a:r>
+            <a:r>
+              <a:rPr lang="fr-FR" dirty="0" err="1">
+                <a:hlinkClick r:id="rId4"/>
+              </a:rPr>
+              <a:t>arxiv.org</a:t>
+            </a:r>
+            <a:r>
+              <a:rPr lang="fr-FR" dirty="0">
+                <a:hlinkClick r:id="rId4"/>
+              </a:rPr>
+              <a:t>/</a:t>
+            </a:r>
+            <a:r>
+              <a:rPr lang="fr-FR" dirty="0" err="1">
+                <a:hlinkClick r:id="rId4"/>
+              </a:rPr>
+              <a:t>pdf</a:t>
+            </a:r>
+            <a:r>
+              <a:rPr lang="fr-FR" dirty="0">
+                <a:hlinkClick r:id="rId4"/>
+              </a:rPr>
+              <a:t>/1802.07228.pdf</a:t>
+            </a:r>
+            <a:endParaRPr lang="fr-FR" dirty="0"/>
+          </a:p>
+        </p:txBody>
+      </p:sp>
+      <p:sp>
+        <p:nvSpPr>
+          <p:cNvPr id="9" name="Rectangle 8">
+            <a:extLst>
+              <a:ext uri="{FF2B5EF4-FFF2-40B4-BE49-F238E27FC236}">
+                <a16:creationId xmlns:a16="http://schemas.microsoft.com/office/drawing/2014/main" id="{7F542431-C6B1-F741-8CFF-ED8041211A32}"/>
+              </a:ext>
+            </a:extLst>
+          </p:cNvPr>
+          <p:cNvSpPr/>
+          <p:nvPr/>
+        </p:nvSpPr>
+        <p:spPr>
+          <a:xfrm>
+            <a:off x="1271768" y="6005484"/>
+            <a:ext cx="2776337" cy="369332"/>
+          </a:xfrm>
+          <a:prstGeom prst="rect">
+            <a:avLst/>
+          </a:prstGeom>
+        </p:spPr>
+        <p:txBody>
+          <a:bodyPr wrap="none">
+            <a:spAutoFit/>
+          </a:bodyPr>
+          <a:lstStyle/>
+          <a:p>
+            <a:r>
+              <a:rPr lang="fr-FR" dirty="0">
+                <a:hlinkClick r:id="rId5"/>
+              </a:rPr>
+              <a:t>http://</a:t>
+            </a:r>
+            <a:r>
+              <a:rPr lang="fr-FR" dirty="0" err="1">
+                <a:hlinkClick r:id="rId5"/>
+              </a:rPr>
+              <a:t>www.image-net.org</a:t>
+            </a:r>
+            <a:r>
+              <a:rPr lang="fr-FR" dirty="0">
+                <a:hlinkClick r:id="rId5"/>
+              </a:rPr>
+              <a:t>/</a:t>
+            </a:r>
+            <a:endParaRPr lang="fr-FR" dirty="0"/>
+          </a:p>
+        </p:txBody>
+      </p:sp>
     </p:spTree>
     <p:extLst>
       <p:ext uri="{BB962C8B-B14F-4D97-AF65-F5344CB8AC3E}">

</xml_diff>